<commit_message>
first flink project , to filter movies with Drama
</commit_message>
<xml_diff>
--- a/Learning.pptx
+++ b/Learning.pptx
@@ -10,6 +10,9 @@
     <p:sldId id="257" r:id="rId4"/>
     <p:sldId id="259" r:id="rId5"/>
     <p:sldId id="260" r:id="rId6"/>
+    <p:sldId id="261" r:id="rId7"/>
+    <p:sldId id="262" r:id="rId8"/>
+    <p:sldId id="263" r:id="rId9"/>
   </p:sldIdLst>
   <p:sldSz cx="12192000" cy="6858000"/>
   <p:notesSz cx="6858000" cy="9144000"/>
@@ -259,7 +262,7 @@
           <a:p>
             <a:fld id="{6DCCBEB6-25A9-4BA2-9C80-AAD61619744B}" type="datetimeFigureOut">
               <a:rPr lang="en-US" smtClean="0"/>
-              <a:t>7/8/2021</a:t>
+              <a:t>10/21/2021</a:t>
             </a:fld>
             <a:endParaRPr lang="en-US"/>
           </a:p>
@@ -429,7 +432,7 @@
           <a:p>
             <a:fld id="{6DCCBEB6-25A9-4BA2-9C80-AAD61619744B}" type="datetimeFigureOut">
               <a:rPr lang="en-US" smtClean="0"/>
-              <a:t>7/8/2021</a:t>
+              <a:t>10/21/2021</a:t>
             </a:fld>
             <a:endParaRPr lang="en-US"/>
           </a:p>
@@ -609,7 +612,7 @@
           <a:p>
             <a:fld id="{6DCCBEB6-25A9-4BA2-9C80-AAD61619744B}" type="datetimeFigureOut">
               <a:rPr lang="en-US" smtClean="0"/>
-              <a:t>7/8/2021</a:t>
+              <a:t>10/21/2021</a:t>
             </a:fld>
             <a:endParaRPr lang="en-US"/>
           </a:p>
@@ -779,7 +782,7 @@
           <a:p>
             <a:fld id="{6DCCBEB6-25A9-4BA2-9C80-AAD61619744B}" type="datetimeFigureOut">
               <a:rPr lang="en-US" smtClean="0"/>
-              <a:t>7/8/2021</a:t>
+              <a:t>10/21/2021</a:t>
             </a:fld>
             <a:endParaRPr lang="en-US"/>
           </a:p>
@@ -1025,7 +1028,7 @@
           <a:p>
             <a:fld id="{6DCCBEB6-25A9-4BA2-9C80-AAD61619744B}" type="datetimeFigureOut">
               <a:rPr lang="en-US" smtClean="0"/>
-              <a:t>7/8/2021</a:t>
+              <a:t>10/21/2021</a:t>
             </a:fld>
             <a:endParaRPr lang="en-US"/>
           </a:p>
@@ -1257,7 +1260,7 @@
           <a:p>
             <a:fld id="{6DCCBEB6-25A9-4BA2-9C80-AAD61619744B}" type="datetimeFigureOut">
               <a:rPr lang="en-US" smtClean="0"/>
-              <a:t>7/8/2021</a:t>
+              <a:t>10/21/2021</a:t>
             </a:fld>
             <a:endParaRPr lang="en-US"/>
           </a:p>
@@ -1624,7 +1627,7 @@
           <a:p>
             <a:fld id="{6DCCBEB6-25A9-4BA2-9C80-AAD61619744B}" type="datetimeFigureOut">
               <a:rPr lang="en-US" smtClean="0"/>
-              <a:t>7/8/2021</a:t>
+              <a:t>10/21/2021</a:t>
             </a:fld>
             <a:endParaRPr lang="en-US"/>
           </a:p>
@@ -1742,7 +1745,7 @@
           <a:p>
             <a:fld id="{6DCCBEB6-25A9-4BA2-9C80-AAD61619744B}" type="datetimeFigureOut">
               <a:rPr lang="en-US" smtClean="0"/>
-              <a:t>7/8/2021</a:t>
+              <a:t>10/21/2021</a:t>
             </a:fld>
             <a:endParaRPr lang="en-US"/>
           </a:p>
@@ -1837,7 +1840,7 @@
           <a:p>
             <a:fld id="{6DCCBEB6-25A9-4BA2-9C80-AAD61619744B}" type="datetimeFigureOut">
               <a:rPr lang="en-US" smtClean="0"/>
-              <a:t>7/8/2021</a:t>
+              <a:t>10/21/2021</a:t>
             </a:fld>
             <a:endParaRPr lang="en-US"/>
           </a:p>
@@ -2114,7 +2117,7 @@
           <a:p>
             <a:fld id="{6DCCBEB6-25A9-4BA2-9C80-AAD61619744B}" type="datetimeFigureOut">
               <a:rPr lang="en-US" smtClean="0"/>
-              <a:t>7/8/2021</a:t>
+              <a:t>10/21/2021</a:t>
             </a:fld>
             <a:endParaRPr lang="en-US"/>
           </a:p>
@@ -2367,7 +2370,7 @@
           <a:p>
             <a:fld id="{6DCCBEB6-25A9-4BA2-9C80-AAD61619744B}" type="datetimeFigureOut">
               <a:rPr lang="en-US" smtClean="0"/>
-              <a:t>7/8/2021</a:t>
+              <a:t>10/21/2021</a:t>
             </a:fld>
             <a:endParaRPr lang="en-US"/>
           </a:p>
@@ -2580,7 +2583,7 @@
           <a:p>
             <a:fld id="{6DCCBEB6-25A9-4BA2-9C80-AAD61619744B}" type="datetimeFigureOut">
               <a:rPr lang="en-US" smtClean="0"/>
-              <a:t>7/8/2021</a:t>
+              <a:t>10/21/2021</a:t>
             </a:fld>
             <a:endParaRPr lang="en-US"/>
           </a:p>
@@ -3426,6 +3429,168 @@
 </p:sld>
 </file>
 
+<file path=ppt/slides/slide6.xml><?xml version="1.0" encoding="utf-8"?>
+<p:sld xmlns:a="http://schemas.openxmlformats.org/drawingml/2006/main" xmlns:r="http://schemas.openxmlformats.org/officeDocument/2006/relationships" xmlns:p="http://schemas.openxmlformats.org/presentationml/2006/main">
+  <p:cSld>
+    <p:spTree>
+      <p:nvGrpSpPr>
+        <p:cNvPr id="1" name=""/>
+        <p:cNvGrpSpPr/>
+        <p:nvPr/>
+      </p:nvGrpSpPr>
+      <p:grpSpPr>
+        <a:xfrm>
+          <a:off x="0" y="0"/>
+          <a:ext cx="0" cy="0"/>
+          <a:chOff x="0" y="0"/>
+          <a:chExt cx="0" cy="0"/>
+        </a:xfrm>
+      </p:grpSpPr>
+      <p:pic>
+        <p:nvPicPr>
+          <p:cNvPr id="3" name="Picture 2"/>
+          <p:cNvPicPr>
+            <a:picLocks noChangeAspect="1"/>
+          </p:cNvPicPr>
+          <p:nvPr/>
+        </p:nvPicPr>
+        <p:blipFill>
+          <a:blip r:embed="rId2"/>
+          <a:stretch>
+            <a:fillRect/>
+          </a:stretch>
+        </p:blipFill>
+        <p:spPr>
+          <a:xfrm>
+            <a:off x="-409575" y="-228600"/>
+            <a:ext cx="13011150" cy="7315200"/>
+          </a:xfrm>
+          <a:prstGeom prst="rect">
+            <a:avLst/>
+          </a:prstGeom>
+        </p:spPr>
+      </p:pic>
+    </p:spTree>
+    <p:extLst>
+      <p:ext uri="{BB962C8B-B14F-4D97-AF65-F5344CB8AC3E}">
+        <p14:creationId xmlns:p14="http://schemas.microsoft.com/office/powerpoint/2010/main" val="2600432561"/>
+      </p:ext>
+    </p:extLst>
+  </p:cSld>
+  <p:clrMapOvr>
+    <a:masterClrMapping/>
+  </p:clrMapOvr>
+</p:sld>
+</file>
+
+<file path=ppt/slides/slide7.xml><?xml version="1.0" encoding="utf-8"?>
+<p:sld xmlns:a="http://schemas.openxmlformats.org/drawingml/2006/main" xmlns:r="http://schemas.openxmlformats.org/officeDocument/2006/relationships" xmlns:p="http://schemas.openxmlformats.org/presentationml/2006/main">
+  <p:cSld>
+    <p:spTree>
+      <p:nvGrpSpPr>
+        <p:cNvPr id="1" name=""/>
+        <p:cNvGrpSpPr/>
+        <p:nvPr/>
+      </p:nvGrpSpPr>
+      <p:grpSpPr>
+        <a:xfrm>
+          <a:off x="0" y="0"/>
+          <a:ext cx="0" cy="0"/>
+          <a:chOff x="0" y="0"/>
+          <a:chExt cx="0" cy="0"/>
+        </a:xfrm>
+      </p:grpSpPr>
+      <p:pic>
+        <p:nvPicPr>
+          <p:cNvPr id="2" name="Picture 1"/>
+          <p:cNvPicPr>
+            <a:picLocks noChangeAspect="1"/>
+          </p:cNvPicPr>
+          <p:nvPr/>
+        </p:nvPicPr>
+        <p:blipFill>
+          <a:blip r:embed="rId2"/>
+          <a:stretch>
+            <a:fillRect/>
+          </a:stretch>
+        </p:blipFill>
+        <p:spPr>
+          <a:xfrm>
+            <a:off x="-409575" y="-228600"/>
+            <a:ext cx="13011150" cy="7315200"/>
+          </a:xfrm>
+          <a:prstGeom prst="rect">
+            <a:avLst/>
+          </a:prstGeom>
+        </p:spPr>
+      </p:pic>
+    </p:spTree>
+    <p:extLst>
+      <p:ext uri="{BB962C8B-B14F-4D97-AF65-F5344CB8AC3E}">
+        <p14:creationId xmlns:p14="http://schemas.microsoft.com/office/powerpoint/2010/main" val="1316766329"/>
+      </p:ext>
+    </p:extLst>
+  </p:cSld>
+  <p:clrMapOvr>
+    <a:masterClrMapping/>
+  </p:clrMapOvr>
+</p:sld>
+</file>
+
+<file path=ppt/slides/slide8.xml><?xml version="1.0" encoding="utf-8"?>
+<p:sld xmlns:a="http://schemas.openxmlformats.org/drawingml/2006/main" xmlns:r="http://schemas.openxmlformats.org/officeDocument/2006/relationships" xmlns:p="http://schemas.openxmlformats.org/presentationml/2006/main">
+  <p:cSld>
+    <p:spTree>
+      <p:nvGrpSpPr>
+        <p:cNvPr id="1" name=""/>
+        <p:cNvGrpSpPr/>
+        <p:nvPr/>
+      </p:nvGrpSpPr>
+      <p:grpSpPr>
+        <a:xfrm>
+          <a:off x="0" y="0"/>
+          <a:ext cx="0" cy="0"/>
+          <a:chOff x="0" y="0"/>
+          <a:chExt cx="0" cy="0"/>
+        </a:xfrm>
+      </p:grpSpPr>
+      <p:pic>
+        <p:nvPicPr>
+          <p:cNvPr id="2" name="Picture 1"/>
+          <p:cNvPicPr>
+            <a:picLocks noChangeAspect="1"/>
+          </p:cNvPicPr>
+          <p:nvPr/>
+        </p:nvPicPr>
+        <p:blipFill>
+          <a:blip r:embed="rId2"/>
+          <a:stretch>
+            <a:fillRect/>
+          </a:stretch>
+        </p:blipFill>
+        <p:spPr>
+          <a:xfrm>
+            <a:off x="-409575" y="-228600"/>
+            <a:ext cx="13011150" cy="7315200"/>
+          </a:xfrm>
+          <a:prstGeom prst="rect">
+            <a:avLst/>
+          </a:prstGeom>
+        </p:spPr>
+      </p:pic>
+    </p:spTree>
+    <p:extLst>
+      <p:ext uri="{BB962C8B-B14F-4D97-AF65-F5344CB8AC3E}">
+        <p14:creationId xmlns:p14="http://schemas.microsoft.com/office/powerpoint/2010/main" val="3077211420"/>
+      </p:ext>
+    </p:extLst>
+  </p:cSld>
+  <p:clrMapOvr>
+    <a:masterClrMapping/>
+  </p:clrMapOvr>
+</p:sld>
+</file>
+
 <file path=ppt/theme/theme1.xml><?xml version="1.0" encoding="utf-8"?>
 <a:theme xmlns:a="http://schemas.openxmlformats.org/drawingml/2006/main" name="Office Theme">
   <a:themeElements>

</xml_diff>